<commit_message>
Update H2O2 vs m-CPBA analysis.pptx
</commit_message>
<xml_diff>
--- a/experiments/h2o2 vs mcpba/H2O2 vs m-CPBA analysis.pptx
+++ b/experiments/h2o2 vs mcpba/H2O2 vs m-CPBA analysis.pptx
@@ -105,7 +105,41 @@
       </a:defRPr>
     </a:lvl9pPr>
   </p:defaultTextStyle>
+  <p:extLst>
+    <p:ext uri="{EFAFB233-063F-42B5-8137-9DF3F51BA10A}">
+      <p15:sldGuideLst xmlns:p15="http://schemas.microsoft.com/office/powerpoint/2012/main"/>
+    </p:ext>
+  </p:extLst>
 </p:presentation>
+</file>
+
+<file path=ppt/changesInfos/changesInfo1.xml><?xml version="1.0" encoding="utf-8"?>
+<pc:chgInfo xmlns:a="http://schemas.openxmlformats.org/drawingml/2006/main" xmlns:r="http://schemas.openxmlformats.org/officeDocument/2006/relationships" xmlns:ac="http://schemas.microsoft.com/office/drawing/2013/main/command" xmlns:pc="http://schemas.microsoft.com/office/powerpoint/2013/main/command">
+  <pc:docChgLst>
+    <pc:chgData name="md.anderson03@gmail.com" userId="9775220ff73936ab" providerId="LiveId" clId="{BA842781-23FE-4B66-9807-1B52C4CC6E64}"/>
+    <pc:docChg chg="modSld">
+      <pc:chgData name="md.anderson03@gmail.com" userId="9775220ff73936ab" providerId="LiveId" clId="{BA842781-23FE-4B66-9807-1B52C4CC6E64}" dt="2022-09-08T19:02:53.022" v="60" actId="20577"/>
+      <pc:docMkLst>
+        <pc:docMk/>
+      </pc:docMkLst>
+      <pc:sldChg chg="modSp mod">
+        <pc:chgData name="md.anderson03@gmail.com" userId="9775220ff73936ab" providerId="LiveId" clId="{BA842781-23FE-4B66-9807-1B52C4CC6E64}" dt="2022-09-08T19:02:53.022" v="60" actId="20577"/>
+        <pc:sldMkLst>
+          <pc:docMk/>
+          <pc:sldMk cId="2201536200" sldId="257"/>
+        </pc:sldMkLst>
+        <pc:spChg chg="mod">
+          <ac:chgData name="md.anderson03@gmail.com" userId="9775220ff73936ab" providerId="LiveId" clId="{BA842781-23FE-4B66-9807-1B52C4CC6E64}" dt="2022-09-08T19:02:53.022" v="60" actId="20577"/>
+          <ac:spMkLst>
+            <pc:docMk/>
+            <pc:sldMk cId="2201536200" sldId="257"/>
+            <ac:spMk id="3" creationId="{FA61E669-BB0D-41D0-8C3D-DE9D7AD44237}"/>
+          </ac:spMkLst>
+        </pc:spChg>
+      </pc:sldChg>
+    </pc:docChg>
+  </pc:docChgLst>
+</pc:chgInfo>
 </file>
 
 <file path=ppt/slideLayouts/slideLayout1.xml><?xml version="1.0" encoding="utf-8"?>
@@ -3454,12 +3488,30 @@
             <p:ph idx="1"/>
           </p:nvPr>
         </p:nvSpPr>
-        <p:spPr/>
-        <p:txBody>
-          <a:bodyPr/>
-          <a:lstStyle/>
-          <a:p>
-            <a:endParaRPr lang="en-US"/>
+        <p:spPr>
+          <a:xfrm>
+            <a:off x="838200" y="3428999"/>
+            <a:ext cx="10515600" cy="2747963"/>
+          </a:xfrm>
+        </p:spPr>
+        <p:txBody>
+          <a:bodyPr>
+            <a:normAutofit/>
+          </a:bodyPr>
+          <a:lstStyle/>
+          <a:p>
+            <a:r>
+              <a:rPr lang="en-US" sz="1600" dirty="0"/>
+              <a:t>24mM NaOH is 10M NaOH </a:t>
+            </a:r>
+            <a:r>
+              <a:rPr lang="en-US" sz="1600"/>
+              <a:t>(240uL) </a:t>
+            </a:r>
+            <a:r>
+              <a:rPr lang="en-US" sz="1600" dirty="0"/>
+              <a:t>into 100mL </a:t>
+            </a:r>
           </a:p>
         </p:txBody>
       </p:sp>

</xml_diff>